<commit_message>
Design added in presentation
</commit_message>
<xml_diff>
--- a/Presentation1.pptx
+++ b/Presentation1.pptx
@@ -5,7 +5,7 @@
     <p:sldMasterId id="2147483648" r:id="rId1"/>
   </p:sldMasterIdLst>
   <p:notesMasterIdLst>
-    <p:notesMasterId r:id="rId13"/>
+    <p:notesMasterId r:id="rId15"/>
   </p:notesMasterIdLst>
   <p:sldIdLst>
     <p:sldId id="256" r:id="rId2"/>
@@ -19,6 +19,8 @@
     <p:sldId id="264" r:id="rId10"/>
     <p:sldId id="265" r:id="rId11"/>
     <p:sldId id="266" r:id="rId12"/>
+    <p:sldId id="267" r:id="rId13"/>
+    <p:sldId id="268" r:id="rId14"/>
   </p:sldIdLst>
   <p:sldSz cx="12192000" cy="6858000"/>
   <p:notesSz cx="6858000" cy="9144000"/>
@@ -117,6 +119,11 @@
       </a:defRPr>
     </a:lvl9pPr>
   </p:defaultTextStyle>
+  <p:extLst>
+    <p:ext uri="{EFAFB233-063F-42B5-8137-9DF3F51BA10A}">
+      <p15:sldGuideLst xmlns:p15="http://schemas.microsoft.com/office/powerpoint/2012/main"/>
+    </p:ext>
+  </p:extLst>
 </p:presentation>
 </file>
 
@@ -912,6 +919,174 @@
     <p:extLst>
       <p:ext uri="{BB962C8B-B14F-4D97-AF65-F5344CB8AC3E}">
         <p14:creationId xmlns:p14="http://schemas.microsoft.com/office/powerpoint/2010/main" val="2387236201"/>
+      </p:ext>
+    </p:extLst>
+  </p:cSld>
+  <p:clrMapOvr>
+    <a:masterClrMapping/>
+  </p:clrMapOvr>
+</p:notes>
+</file>
+
+<file path=ppt/notesSlides/notesSlide6.xml><?xml version="1.0" encoding="utf-8"?>
+<p:notes xmlns:a="http://schemas.openxmlformats.org/drawingml/2006/main" xmlns:r="http://schemas.openxmlformats.org/officeDocument/2006/relationships" xmlns:p="http://schemas.openxmlformats.org/presentationml/2006/main">
+  <p:cSld>
+    <p:spTree>
+      <p:nvGrpSpPr>
+        <p:cNvPr id="1" name=""/>
+        <p:cNvGrpSpPr/>
+        <p:nvPr/>
+      </p:nvGrpSpPr>
+      <p:grpSpPr>
+        <a:xfrm>
+          <a:off x="0" y="0"/>
+          <a:ext cx="0" cy="0"/>
+          <a:chOff x="0" y="0"/>
+          <a:chExt cx="0" cy="0"/>
+        </a:xfrm>
+      </p:grpSpPr>
+      <p:sp>
+        <p:nvSpPr>
+          <p:cNvPr id="2" name="Slide Image Placeholder 1"/>
+          <p:cNvSpPr>
+            <a:spLocks noGrp="1" noRot="1" noChangeAspect="1"/>
+          </p:cNvSpPr>
+          <p:nvPr>
+            <p:ph type="sldImg"/>
+          </p:nvPr>
+        </p:nvSpPr>
+        <p:spPr/>
+      </p:sp>
+      <p:sp>
+        <p:nvSpPr>
+          <p:cNvPr id="3" name="Notes Placeholder 2"/>
+          <p:cNvSpPr>
+            <a:spLocks noGrp="1"/>
+          </p:cNvSpPr>
+          <p:nvPr>
+            <p:ph type="body" idx="1"/>
+          </p:nvPr>
+        </p:nvSpPr>
+        <p:spPr/>
+        <p:txBody>
+          <a:bodyPr/>
+          <a:lstStyle/>
+          <a:p>
+            <a:endParaRPr lang="en-US" dirty="0"/>
+          </a:p>
+        </p:txBody>
+      </p:sp>
+      <p:sp>
+        <p:nvSpPr>
+          <p:cNvPr id="4" name="Slide Number Placeholder 3"/>
+          <p:cNvSpPr>
+            <a:spLocks noGrp="1"/>
+          </p:cNvSpPr>
+          <p:nvPr>
+            <p:ph type="sldNum" sz="quarter" idx="10"/>
+          </p:nvPr>
+        </p:nvSpPr>
+        <p:spPr/>
+        <p:txBody>
+          <a:bodyPr/>
+          <a:lstStyle/>
+          <a:p>
+            <a:fld id="{A33CE7B9-5814-4A8B-9DD4-9C70DF11C3D0}" type="slidenum">
+              <a:rPr lang="en-US" smtClean="0"/>
+              <a:t>12</a:t>
+            </a:fld>
+            <a:endParaRPr lang="en-US"/>
+          </a:p>
+        </p:txBody>
+      </p:sp>
+    </p:spTree>
+    <p:extLst>
+      <p:ext uri="{BB962C8B-B14F-4D97-AF65-F5344CB8AC3E}">
+        <p14:creationId xmlns:p14="http://schemas.microsoft.com/office/powerpoint/2010/main" val="475792375"/>
+      </p:ext>
+    </p:extLst>
+  </p:cSld>
+  <p:clrMapOvr>
+    <a:masterClrMapping/>
+  </p:clrMapOvr>
+</p:notes>
+</file>
+
+<file path=ppt/notesSlides/notesSlide7.xml><?xml version="1.0" encoding="utf-8"?>
+<p:notes xmlns:a="http://schemas.openxmlformats.org/drawingml/2006/main" xmlns:r="http://schemas.openxmlformats.org/officeDocument/2006/relationships" xmlns:p="http://schemas.openxmlformats.org/presentationml/2006/main">
+  <p:cSld>
+    <p:spTree>
+      <p:nvGrpSpPr>
+        <p:cNvPr id="1" name=""/>
+        <p:cNvGrpSpPr/>
+        <p:nvPr/>
+      </p:nvGrpSpPr>
+      <p:grpSpPr>
+        <a:xfrm>
+          <a:off x="0" y="0"/>
+          <a:ext cx="0" cy="0"/>
+          <a:chOff x="0" y="0"/>
+          <a:chExt cx="0" cy="0"/>
+        </a:xfrm>
+      </p:grpSpPr>
+      <p:sp>
+        <p:nvSpPr>
+          <p:cNvPr id="2" name="Slide Image Placeholder 1"/>
+          <p:cNvSpPr>
+            <a:spLocks noGrp="1" noRot="1" noChangeAspect="1"/>
+          </p:cNvSpPr>
+          <p:nvPr>
+            <p:ph type="sldImg"/>
+          </p:nvPr>
+        </p:nvSpPr>
+        <p:spPr/>
+      </p:sp>
+      <p:sp>
+        <p:nvSpPr>
+          <p:cNvPr id="3" name="Notes Placeholder 2"/>
+          <p:cNvSpPr>
+            <a:spLocks noGrp="1"/>
+          </p:cNvSpPr>
+          <p:nvPr>
+            <p:ph type="body" idx="1"/>
+          </p:nvPr>
+        </p:nvSpPr>
+        <p:spPr/>
+        <p:txBody>
+          <a:bodyPr/>
+          <a:lstStyle/>
+          <a:p>
+            <a:endParaRPr lang="en-US" dirty="0"/>
+          </a:p>
+        </p:txBody>
+      </p:sp>
+      <p:sp>
+        <p:nvSpPr>
+          <p:cNvPr id="4" name="Slide Number Placeholder 3"/>
+          <p:cNvSpPr>
+            <a:spLocks noGrp="1"/>
+          </p:cNvSpPr>
+          <p:nvPr>
+            <p:ph type="sldNum" sz="quarter" idx="10"/>
+          </p:nvPr>
+        </p:nvSpPr>
+        <p:spPr/>
+        <p:txBody>
+          <a:bodyPr/>
+          <a:lstStyle/>
+          <a:p>
+            <a:fld id="{A33CE7B9-5814-4A8B-9DD4-9C70DF11C3D0}" type="slidenum">
+              <a:rPr lang="en-US" smtClean="0"/>
+              <a:t>13</a:t>
+            </a:fld>
+            <a:endParaRPr lang="en-US"/>
+          </a:p>
+        </p:txBody>
+      </p:sp>
+    </p:spTree>
+    <p:extLst>
+      <p:ext uri="{BB962C8B-B14F-4D97-AF65-F5344CB8AC3E}">
+        <p14:creationId xmlns:p14="http://schemas.microsoft.com/office/powerpoint/2010/main" val="3226629427"/>
       </p:ext>
     </p:extLst>
   </p:cSld>
@@ -4205,14 +4380,11 @@
               <a:buChar char="•"/>
             </a:pPr>
             <a:r>
-              <a:rPr lang="en-US" sz="2800" b="1" dirty="0">
+              <a:rPr lang="en-US" sz="2800" dirty="0">
                 <a:latin typeface="Tw Cen MT" panose="020B0602020104020603" pitchFamily="34" charset="0"/>
               </a:rPr>
               <a:t>Requirement Gathering and Analysis Phase</a:t>
             </a:r>
-            <a:endParaRPr lang="en-US" sz="2800" dirty="0">
-              <a:latin typeface="Tw Cen MT" panose="020B0602020104020603" pitchFamily="34" charset="0"/>
-            </a:endParaRPr>
           </a:p>
           <a:p>
             <a:pPr marL="285750" indent="-285750">
@@ -4223,14 +4395,11 @@
               <a:buChar char="•"/>
             </a:pPr>
             <a:r>
-              <a:rPr lang="en-US" sz="2800" b="1" dirty="0">
+              <a:rPr lang="en-US" sz="2800" dirty="0">
                 <a:latin typeface="Tw Cen MT" panose="020B0602020104020603" pitchFamily="34" charset="0"/>
               </a:rPr>
               <a:t>Design Phase</a:t>
             </a:r>
-            <a:endParaRPr lang="en-US" sz="2800" dirty="0">
-              <a:latin typeface="Tw Cen MT" panose="020B0602020104020603" pitchFamily="34" charset="0"/>
-            </a:endParaRPr>
           </a:p>
           <a:p>
             <a:pPr marL="285750" indent="-285750">
@@ -4241,14 +4410,11 @@
               <a:buChar char="•"/>
             </a:pPr>
             <a:r>
-              <a:rPr lang="en-US" sz="2800" b="1" dirty="0">
+              <a:rPr lang="en-US" sz="2800" dirty="0">
                 <a:latin typeface="Tw Cen MT" panose="020B0602020104020603" pitchFamily="34" charset="0"/>
               </a:rPr>
               <a:t>Implement Phase</a:t>
             </a:r>
-            <a:endParaRPr lang="en-US" sz="2800" dirty="0">
-              <a:latin typeface="Tw Cen MT" panose="020B0602020104020603" pitchFamily="34" charset="0"/>
-            </a:endParaRPr>
           </a:p>
           <a:p>
             <a:pPr marL="285750" indent="-285750">
@@ -4259,14 +4425,11 @@
               <a:buChar char="•"/>
             </a:pPr>
             <a:r>
-              <a:rPr lang="en-US" sz="2800" b="1" dirty="0">
+              <a:rPr lang="en-US" sz="2800" dirty="0">
                 <a:latin typeface="Tw Cen MT" panose="020B0602020104020603" pitchFamily="34" charset="0"/>
               </a:rPr>
               <a:t>Test Phase</a:t>
             </a:r>
-            <a:endParaRPr lang="en-US" sz="2800" dirty="0">
-              <a:latin typeface="Tw Cen MT" panose="020B0602020104020603" pitchFamily="34" charset="0"/>
-            </a:endParaRPr>
           </a:p>
           <a:p>
             <a:pPr marL="285750" indent="-285750">
@@ -4277,14 +4440,11 @@
               <a:buChar char="•"/>
             </a:pPr>
             <a:r>
-              <a:rPr lang="en-US" sz="2800" b="1" dirty="0">
+              <a:rPr lang="en-US" sz="2800" dirty="0">
                 <a:latin typeface="Tw Cen MT" panose="020B0602020104020603" pitchFamily="34" charset="0"/>
               </a:rPr>
               <a:t>Deploy Phase</a:t>
             </a:r>
-            <a:endParaRPr lang="en-US" sz="2800" dirty="0">
-              <a:latin typeface="Tw Cen MT" panose="020B0602020104020603" pitchFamily="34" charset="0"/>
-            </a:endParaRPr>
           </a:p>
           <a:p>
             <a:pPr marL="285750" indent="-285750">
@@ -4295,13 +4455,13 @@
               <a:buChar char="•"/>
             </a:pPr>
             <a:r>
-              <a:rPr lang="en-US" sz="2800" b="1" dirty="0">
+              <a:rPr lang="en-US" sz="2800" dirty="0">
                 <a:latin typeface="Tw Cen MT" panose="020B0602020104020603" pitchFamily="34" charset="0"/>
               </a:rPr>
               <a:t>Maintenance </a:t>
             </a:r>
             <a:r>
-              <a:rPr lang="en-US" sz="2800" b="1" dirty="0" smtClean="0">
+              <a:rPr lang="en-US" sz="2800" dirty="0" smtClean="0">
                 <a:latin typeface="Tw Cen MT" panose="020B0602020104020603" pitchFamily="34" charset="0"/>
               </a:rPr>
               <a:t>Phase</a:t>
@@ -4316,6 +4476,649 @@
     <p:extLst>
       <p:ext uri="{BB962C8B-B14F-4D97-AF65-F5344CB8AC3E}">
         <p14:creationId xmlns:p14="http://schemas.microsoft.com/office/powerpoint/2010/main" val="2093491698"/>
+      </p:ext>
+    </p:extLst>
+  </p:cSld>
+  <p:clrMapOvr>
+    <a:masterClrMapping/>
+  </p:clrMapOvr>
+  <p:timing>
+    <p:tnLst>
+      <p:par>
+        <p:cTn id="1" dur="indefinite" restart="never" nodeType="tmRoot"/>
+      </p:par>
+    </p:tnLst>
+  </p:timing>
+</p:sld>
+</file>
+
+<file path=ppt/slides/slide12.xml><?xml version="1.0" encoding="utf-8"?>
+<p:sld xmlns:a="http://schemas.openxmlformats.org/drawingml/2006/main" xmlns:r="http://schemas.openxmlformats.org/officeDocument/2006/relationships" xmlns:p="http://schemas.openxmlformats.org/presentationml/2006/main">
+  <p:cSld>
+    <p:spTree>
+      <p:nvGrpSpPr>
+        <p:cNvPr id="1" name=""/>
+        <p:cNvGrpSpPr/>
+        <p:nvPr/>
+      </p:nvGrpSpPr>
+      <p:grpSpPr>
+        <a:xfrm>
+          <a:off x="0" y="0"/>
+          <a:ext cx="0" cy="0"/>
+          <a:chOff x="0" y="0"/>
+          <a:chExt cx="0" cy="0"/>
+        </a:xfrm>
+      </p:grpSpPr>
+      <p:sp>
+        <p:nvSpPr>
+          <p:cNvPr id="4" name="TextBox 3"/>
+          <p:cNvSpPr txBox="1"/>
+          <p:nvPr/>
+        </p:nvSpPr>
+        <p:spPr>
+          <a:xfrm>
+            <a:off x="11237893" y="0"/>
+            <a:ext cx="954107" cy="6858000"/>
+          </a:xfrm>
+          <a:prstGeom prst="rect">
+            <a:avLst/>
+          </a:prstGeom>
+          <a:solidFill>
+            <a:schemeClr val="bg1">
+              <a:lumMod val="50000"/>
+            </a:schemeClr>
+          </a:solidFill>
+        </p:spPr>
+        <p:txBody>
+          <a:bodyPr vert="vert270" wrap="square" rtlCol="0">
+            <a:spAutoFit/>
+          </a:bodyPr>
+          <a:lstStyle/>
+          <a:p>
+            <a:pPr algn="ctr"/>
+            <a:r>
+              <a:rPr lang="en-US" sz="5000" b="1" dirty="0" smtClean="0">
+                <a:solidFill>
+                  <a:schemeClr val="bg1"/>
+                </a:solidFill>
+                <a:latin typeface="Tw Cen MT" panose="020B0602020104020603" pitchFamily="34" charset="0"/>
+              </a:rPr>
+              <a:t>Design</a:t>
+            </a:r>
+            <a:endParaRPr lang="en-US" sz="5000" b="1" dirty="0">
+              <a:solidFill>
+                <a:schemeClr val="bg1"/>
+              </a:solidFill>
+              <a:latin typeface="Tw Cen MT" panose="020B0602020104020603" pitchFamily="34" charset="0"/>
+            </a:endParaRPr>
+          </a:p>
+        </p:txBody>
+      </p:sp>
+      <p:sp>
+        <p:nvSpPr>
+          <p:cNvPr id="5" name="TextBox 4"/>
+          <p:cNvSpPr txBox="1"/>
+          <p:nvPr/>
+        </p:nvSpPr>
+        <p:spPr>
+          <a:xfrm>
+            <a:off x="595085" y="348006"/>
+            <a:ext cx="9840686" cy="707886"/>
+          </a:xfrm>
+          <a:prstGeom prst="rect">
+            <a:avLst/>
+          </a:prstGeom>
+          <a:noFill/>
+        </p:spPr>
+        <p:txBody>
+          <a:bodyPr wrap="square" rtlCol="0">
+            <a:spAutoFit/>
+          </a:bodyPr>
+          <a:lstStyle/>
+          <a:p>
+            <a:r>
+              <a:rPr lang="en-US" sz="4000" b="1" dirty="0" smtClean="0">
+                <a:latin typeface="Tw Cen MT" panose="020B0602020104020603" pitchFamily="34" charset="0"/>
+              </a:rPr>
+              <a:t>Tools And Techniques</a:t>
+            </a:r>
+            <a:endParaRPr lang="en-US" sz="4000" b="1" dirty="0">
+              <a:latin typeface="Tw Cen MT" panose="020B0602020104020603" pitchFamily="34" charset="0"/>
+            </a:endParaRPr>
+          </a:p>
+        </p:txBody>
+      </p:sp>
+      <p:sp>
+        <p:nvSpPr>
+          <p:cNvPr id="6" name="TextBox 5"/>
+          <p:cNvSpPr txBox="1"/>
+          <p:nvPr/>
+        </p:nvSpPr>
+        <p:spPr>
+          <a:xfrm>
+            <a:off x="1436913" y="1055892"/>
+            <a:ext cx="8752116" cy="4401205"/>
+          </a:xfrm>
+          <a:prstGeom prst="rect">
+            <a:avLst/>
+          </a:prstGeom>
+          <a:noFill/>
+        </p:spPr>
+        <p:txBody>
+          <a:bodyPr wrap="square" rtlCol="0">
+            <a:spAutoFit/>
+          </a:bodyPr>
+          <a:lstStyle/>
+          <a:p>
+            <a:pPr marL="285750" indent="-285750">
+              <a:lnSpc>
+                <a:spcPct val="200000"/>
+              </a:lnSpc>
+              <a:buFont typeface="Arial" panose="020B0604020202020204" pitchFamily="34" charset="0"/>
+              <a:buChar char="•"/>
+            </a:pPr>
+            <a:r>
+              <a:rPr lang="en-US" sz="2800" dirty="0" smtClean="0">
+                <a:latin typeface="Tw Cen MT" panose="020B0602020104020603" pitchFamily="34" charset="0"/>
+              </a:rPr>
+              <a:t>MS Visio</a:t>
+            </a:r>
+          </a:p>
+          <a:p>
+            <a:pPr marL="285750" indent="-285750">
+              <a:lnSpc>
+                <a:spcPct val="200000"/>
+              </a:lnSpc>
+              <a:buFont typeface="Arial" panose="020B0604020202020204" pitchFamily="34" charset="0"/>
+              <a:buChar char="•"/>
+            </a:pPr>
+            <a:r>
+              <a:rPr lang="en-US" sz="2800" dirty="0" smtClean="0">
+                <a:latin typeface="Tw Cen MT" panose="020B0602020104020603" pitchFamily="34" charset="0"/>
+              </a:rPr>
+              <a:t>Project 2016</a:t>
+            </a:r>
+          </a:p>
+          <a:p>
+            <a:pPr marL="285750" indent="-285750">
+              <a:lnSpc>
+                <a:spcPct val="200000"/>
+              </a:lnSpc>
+              <a:buFont typeface="Arial" panose="020B0604020202020204" pitchFamily="34" charset="0"/>
+              <a:buChar char="•"/>
+            </a:pPr>
+            <a:r>
+              <a:rPr lang="en-US" sz="2800" dirty="0" smtClean="0">
+                <a:latin typeface="Tw Cen MT" panose="020B0602020104020603" pitchFamily="34" charset="0"/>
+              </a:rPr>
+              <a:t>IDE</a:t>
+            </a:r>
+          </a:p>
+          <a:p>
+            <a:pPr marL="285750" indent="-285750">
+              <a:lnSpc>
+                <a:spcPct val="200000"/>
+              </a:lnSpc>
+              <a:buFont typeface="Arial" panose="020B0604020202020204" pitchFamily="34" charset="0"/>
+              <a:buChar char="•"/>
+            </a:pPr>
+            <a:r>
+              <a:rPr lang="en-US" sz="2800" dirty="0" smtClean="0">
+                <a:latin typeface="Tw Cen MT" panose="020B0602020104020603" pitchFamily="34" charset="0"/>
+              </a:rPr>
+              <a:t>SQL</a:t>
+            </a:r>
+            <a:r>
+              <a:rPr lang="en-US" sz="2800" dirty="0">
+                <a:latin typeface="Tw Cen MT" panose="020B0602020104020603" pitchFamily="34" charset="0"/>
+              </a:rPr>
+              <a:t> </a:t>
+            </a:r>
+            <a:r>
+              <a:rPr lang="en-US" sz="2800" dirty="0" smtClean="0">
+                <a:latin typeface="Tw Cen MT" panose="020B0602020104020603" pitchFamily="34" charset="0"/>
+              </a:rPr>
+              <a:t>workbench</a:t>
+            </a:r>
+          </a:p>
+          <a:p>
+            <a:pPr marL="285750" indent="-285750">
+              <a:lnSpc>
+                <a:spcPct val="200000"/>
+              </a:lnSpc>
+              <a:buFont typeface="Arial" panose="020B0604020202020204" pitchFamily="34" charset="0"/>
+              <a:buChar char="•"/>
+            </a:pPr>
+            <a:r>
+              <a:rPr lang="en-US" sz="2800" dirty="0" smtClean="0">
+                <a:latin typeface="Tw Cen MT" panose="020B0602020104020603" pitchFamily="34" charset="0"/>
+              </a:rPr>
+              <a:t>Java JDK</a:t>
+            </a:r>
+          </a:p>
+        </p:txBody>
+      </p:sp>
+    </p:spTree>
+    <p:extLst>
+      <p:ext uri="{BB962C8B-B14F-4D97-AF65-F5344CB8AC3E}">
+        <p14:creationId xmlns:p14="http://schemas.microsoft.com/office/powerpoint/2010/main" val="2359976865"/>
+      </p:ext>
+    </p:extLst>
+  </p:cSld>
+  <p:clrMapOvr>
+    <a:masterClrMapping/>
+  </p:clrMapOvr>
+  <p:timing>
+    <p:tnLst>
+      <p:par>
+        <p:cTn id="1" dur="indefinite" restart="never" nodeType="tmRoot"/>
+      </p:par>
+    </p:tnLst>
+  </p:timing>
+</p:sld>
+</file>
+
+<file path=ppt/slides/slide13.xml><?xml version="1.0" encoding="utf-8"?>
+<p:sld xmlns:a="http://schemas.openxmlformats.org/drawingml/2006/main" xmlns:r="http://schemas.openxmlformats.org/officeDocument/2006/relationships" xmlns:p="http://schemas.openxmlformats.org/presentationml/2006/main">
+  <p:cSld>
+    <p:spTree>
+      <p:nvGrpSpPr>
+        <p:cNvPr id="1" name=""/>
+        <p:cNvGrpSpPr/>
+        <p:nvPr/>
+      </p:nvGrpSpPr>
+      <p:grpSpPr>
+        <a:xfrm>
+          <a:off x="0" y="0"/>
+          <a:ext cx="0" cy="0"/>
+          <a:chOff x="0" y="0"/>
+          <a:chExt cx="0" cy="0"/>
+        </a:xfrm>
+      </p:grpSpPr>
+      <p:sp>
+        <p:nvSpPr>
+          <p:cNvPr id="4" name="TextBox 3"/>
+          <p:cNvSpPr txBox="1"/>
+          <p:nvPr/>
+        </p:nvSpPr>
+        <p:spPr>
+          <a:xfrm>
+            <a:off x="11237893" y="0"/>
+            <a:ext cx="954107" cy="6858000"/>
+          </a:xfrm>
+          <a:prstGeom prst="rect">
+            <a:avLst/>
+          </a:prstGeom>
+          <a:solidFill>
+            <a:schemeClr val="bg1">
+              <a:lumMod val="50000"/>
+            </a:schemeClr>
+          </a:solidFill>
+        </p:spPr>
+        <p:txBody>
+          <a:bodyPr vert="vert270" wrap="square" rtlCol="0">
+            <a:spAutoFit/>
+          </a:bodyPr>
+          <a:lstStyle/>
+          <a:p>
+            <a:pPr algn="ctr"/>
+            <a:r>
+              <a:rPr lang="en-US" sz="5000" b="1" dirty="0" smtClean="0">
+                <a:solidFill>
+                  <a:schemeClr val="bg1"/>
+                </a:solidFill>
+                <a:latin typeface="Tw Cen MT" panose="020B0602020104020603" pitchFamily="34" charset="0"/>
+              </a:rPr>
+              <a:t>Design</a:t>
+            </a:r>
+            <a:endParaRPr lang="en-US" sz="5000" b="1" dirty="0">
+              <a:solidFill>
+                <a:schemeClr val="bg1"/>
+              </a:solidFill>
+              <a:latin typeface="Tw Cen MT" panose="020B0602020104020603" pitchFamily="34" charset="0"/>
+            </a:endParaRPr>
+          </a:p>
+        </p:txBody>
+      </p:sp>
+      <p:sp>
+        <p:nvSpPr>
+          <p:cNvPr id="5" name="TextBox 4"/>
+          <p:cNvSpPr txBox="1"/>
+          <p:nvPr/>
+        </p:nvSpPr>
+        <p:spPr>
+          <a:xfrm>
+            <a:off x="595085" y="348006"/>
+            <a:ext cx="9840686" cy="707886"/>
+          </a:xfrm>
+          <a:prstGeom prst="rect">
+            <a:avLst/>
+          </a:prstGeom>
+          <a:noFill/>
+        </p:spPr>
+        <p:txBody>
+          <a:bodyPr wrap="square" rtlCol="0">
+            <a:spAutoFit/>
+          </a:bodyPr>
+          <a:lstStyle/>
+          <a:p>
+            <a:r>
+              <a:rPr lang="en-US" sz="4000" b="1" dirty="0" smtClean="0">
+                <a:latin typeface="Tw Cen MT" panose="020B0602020104020603" pitchFamily="34" charset="0"/>
+              </a:rPr>
+              <a:t>Mockups</a:t>
+            </a:r>
+            <a:endParaRPr lang="en-US" sz="4000" b="1" dirty="0">
+              <a:latin typeface="Tw Cen MT" panose="020B0602020104020603" pitchFamily="34" charset="0"/>
+            </a:endParaRPr>
+          </a:p>
+        </p:txBody>
+      </p:sp>
+      <p:sp>
+        <p:nvSpPr>
+          <p:cNvPr id="8" name="Rounded Rectangle 7"/>
+          <p:cNvSpPr/>
+          <p:nvPr/>
+        </p:nvSpPr>
+        <p:spPr>
+          <a:xfrm>
+            <a:off x="2521857" y="1687948"/>
+            <a:ext cx="5987141" cy="3482103"/>
+          </a:xfrm>
+          <a:prstGeom prst="roundRect">
+            <a:avLst>
+              <a:gd name="adj" fmla="val 3369"/>
+            </a:avLst>
+          </a:prstGeom>
+          <a:solidFill>
+            <a:schemeClr val="accent6">
+              <a:lumMod val="60000"/>
+              <a:lumOff val="40000"/>
+            </a:schemeClr>
+          </a:solidFill>
+          <a:ln>
+            <a:noFill/>
+          </a:ln>
+          <a:effectLst>
+            <a:outerShdw blurRad="50800" dist="38100" dir="2700000" algn="tl" rotWithShape="0">
+              <a:prstClr val="black">
+                <a:alpha val="40000"/>
+              </a:prstClr>
+            </a:outerShdw>
+          </a:effectLst>
+        </p:spPr>
+        <p:style>
+          <a:lnRef idx="2">
+            <a:schemeClr val="accent1">
+              <a:shade val="50000"/>
+            </a:schemeClr>
+          </a:lnRef>
+          <a:fillRef idx="1">
+            <a:schemeClr val="accent1"/>
+          </a:fillRef>
+          <a:effectRef idx="0">
+            <a:schemeClr val="accent1"/>
+          </a:effectRef>
+          <a:fontRef idx="minor">
+            <a:schemeClr val="lt1"/>
+          </a:fontRef>
+        </p:style>
+        <p:txBody>
+          <a:bodyPr rtlCol="0" anchor="ctr"/>
+          <a:lstStyle/>
+          <a:p>
+            <a:pPr algn="ctr"/>
+            <a:endParaRPr lang="en-US"/>
+          </a:p>
+        </p:txBody>
+      </p:sp>
+      <p:sp>
+        <p:nvSpPr>
+          <p:cNvPr id="9" name="TextBox 8"/>
+          <p:cNvSpPr txBox="1"/>
+          <p:nvPr/>
+        </p:nvSpPr>
+        <p:spPr>
+          <a:xfrm>
+            <a:off x="3664856" y="1995779"/>
+            <a:ext cx="3701143" cy="461665"/>
+          </a:xfrm>
+          <a:prstGeom prst="rect">
+            <a:avLst/>
+          </a:prstGeom>
+          <a:noFill/>
+        </p:spPr>
+        <p:txBody>
+          <a:bodyPr wrap="square" rtlCol="0">
+            <a:spAutoFit/>
+          </a:bodyPr>
+          <a:lstStyle/>
+          <a:p>
+            <a:pPr algn="ctr"/>
+            <a:r>
+              <a:rPr lang="en-US" sz="2400" dirty="0" smtClean="0">
+                <a:latin typeface="Tw Cen MT" panose="020B0602020104020603" pitchFamily="34" charset="0"/>
+              </a:rPr>
+              <a:t>Admin Login</a:t>
+            </a:r>
+            <a:endParaRPr lang="en-US" sz="2400" dirty="0">
+              <a:latin typeface="Tw Cen MT" panose="020B0602020104020603" pitchFamily="34" charset="0"/>
+            </a:endParaRPr>
+          </a:p>
+        </p:txBody>
+      </p:sp>
+      <p:sp>
+        <p:nvSpPr>
+          <p:cNvPr id="10" name="Rectangle 9"/>
+          <p:cNvSpPr/>
+          <p:nvPr/>
+        </p:nvSpPr>
+        <p:spPr>
+          <a:xfrm>
+            <a:off x="3399244" y="2644795"/>
+            <a:ext cx="4232366" cy="459264"/>
+          </a:xfrm>
+          <a:prstGeom prst="rect">
+            <a:avLst/>
+          </a:prstGeom>
+          <a:solidFill>
+            <a:schemeClr val="bg1">
+              <a:lumMod val="65000"/>
+            </a:schemeClr>
+          </a:solidFill>
+          <a:ln>
+            <a:noFill/>
+          </a:ln>
+        </p:spPr>
+        <p:style>
+          <a:lnRef idx="2">
+            <a:schemeClr val="accent1">
+              <a:shade val="50000"/>
+            </a:schemeClr>
+          </a:lnRef>
+          <a:fillRef idx="1">
+            <a:schemeClr val="accent1"/>
+          </a:fillRef>
+          <a:effectRef idx="0">
+            <a:schemeClr val="accent1"/>
+          </a:effectRef>
+          <a:fontRef idx="minor">
+            <a:schemeClr val="lt1"/>
+          </a:fontRef>
+        </p:style>
+        <p:txBody>
+          <a:bodyPr rtlCol="0" anchor="ctr"/>
+          <a:lstStyle/>
+          <a:p>
+            <a:pPr algn="ctr"/>
+            <a:r>
+              <a:rPr lang="en-US" dirty="0" smtClean="0"/>
+              <a:t>Username</a:t>
+            </a:r>
+            <a:endParaRPr lang="en-US" dirty="0"/>
+          </a:p>
+        </p:txBody>
+      </p:sp>
+      <p:sp>
+        <p:nvSpPr>
+          <p:cNvPr id="11" name="Rectangle 10"/>
+          <p:cNvSpPr/>
+          <p:nvPr/>
+        </p:nvSpPr>
+        <p:spPr>
+          <a:xfrm>
+            <a:off x="3399244" y="3422040"/>
+            <a:ext cx="4232366" cy="459264"/>
+          </a:xfrm>
+          <a:prstGeom prst="rect">
+            <a:avLst/>
+          </a:prstGeom>
+          <a:solidFill>
+            <a:schemeClr val="bg1">
+              <a:lumMod val="65000"/>
+            </a:schemeClr>
+          </a:solidFill>
+          <a:ln>
+            <a:noFill/>
+          </a:ln>
+        </p:spPr>
+        <p:style>
+          <a:lnRef idx="2">
+            <a:schemeClr val="accent1">
+              <a:shade val="50000"/>
+            </a:schemeClr>
+          </a:lnRef>
+          <a:fillRef idx="1">
+            <a:schemeClr val="accent1"/>
+          </a:fillRef>
+          <a:effectRef idx="0">
+            <a:schemeClr val="accent1"/>
+          </a:effectRef>
+          <a:fontRef idx="minor">
+            <a:schemeClr val="lt1"/>
+          </a:fontRef>
+        </p:style>
+        <p:txBody>
+          <a:bodyPr rtlCol="0" anchor="ctr"/>
+          <a:lstStyle/>
+          <a:p>
+            <a:pPr algn="ctr"/>
+            <a:r>
+              <a:rPr lang="en-US" dirty="0" smtClean="0"/>
+              <a:t>Password</a:t>
+            </a:r>
+            <a:endParaRPr lang="en-US" dirty="0"/>
+          </a:p>
+        </p:txBody>
+      </p:sp>
+      <p:sp>
+        <p:nvSpPr>
+          <p:cNvPr id="12" name="Rectangle 11"/>
+          <p:cNvSpPr/>
+          <p:nvPr/>
+        </p:nvSpPr>
+        <p:spPr>
+          <a:xfrm>
+            <a:off x="3399244" y="4208235"/>
+            <a:ext cx="2116183" cy="429873"/>
+          </a:xfrm>
+          <a:prstGeom prst="rect">
+            <a:avLst/>
+          </a:prstGeom>
+          <a:solidFill>
+            <a:schemeClr val="bg1">
+              <a:lumMod val="65000"/>
+            </a:schemeClr>
+          </a:solidFill>
+          <a:ln>
+            <a:noFill/>
+          </a:ln>
+        </p:spPr>
+        <p:style>
+          <a:lnRef idx="2">
+            <a:schemeClr val="accent1">
+              <a:shade val="50000"/>
+            </a:schemeClr>
+          </a:lnRef>
+          <a:fillRef idx="1">
+            <a:schemeClr val="accent1"/>
+          </a:fillRef>
+          <a:effectRef idx="0">
+            <a:schemeClr val="accent1"/>
+          </a:effectRef>
+          <a:fontRef idx="minor">
+            <a:schemeClr val="lt1"/>
+          </a:fontRef>
+        </p:style>
+        <p:txBody>
+          <a:bodyPr rtlCol="0" anchor="ctr"/>
+          <a:lstStyle/>
+          <a:p>
+            <a:pPr algn="ctr"/>
+            <a:r>
+              <a:rPr lang="en-US" dirty="0" smtClean="0"/>
+              <a:t>Login</a:t>
+            </a:r>
+            <a:endParaRPr lang="en-US" dirty="0"/>
+          </a:p>
+        </p:txBody>
+      </p:sp>
+      <p:sp>
+        <p:nvSpPr>
+          <p:cNvPr id="13" name="Rectangle 12"/>
+          <p:cNvSpPr/>
+          <p:nvPr/>
+        </p:nvSpPr>
+        <p:spPr>
+          <a:xfrm>
+            <a:off x="5754912" y="4208234"/>
+            <a:ext cx="1876697" cy="429873"/>
+          </a:xfrm>
+          <a:prstGeom prst="rect">
+            <a:avLst/>
+          </a:prstGeom>
+          <a:solidFill>
+            <a:schemeClr val="bg1">
+              <a:lumMod val="65000"/>
+            </a:schemeClr>
+          </a:solidFill>
+          <a:ln>
+            <a:noFill/>
+          </a:ln>
+        </p:spPr>
+        <p:style>
+          <a:lnRef idx="2">
+            <a:schemeClr val="accent1">
+              <a:shade val="50000"/>
+            </a:schemeClr>
+          </a:lnRef>
+          <a:fillRef idx="1">
+            <a:schemeClr val="accent1"/>
+          </a:fillRef>
+          <a:effectRef idx="0">
+            <a:schemeClr val="accent1"/>
+          </a:effectRef>
+          <a:fontRef idx="minor">
+            <a:schemeClr val="lt1"/>
+          </a:fontRef>
+        </p:style>
+        <p:txBody>
+          <a:bodyPr rtlCol="0" anchor="ctr"/>
+          <a:lstStyle/>
+          <a:p>
+            <a:pPr algn="ctr"/>
+            <a:r>
+              <a:rPr lang="en-US" dirty="0" smtClean="0"/>
+              <a:t>Exit</a:t>
+            </a:r>
+            <a:endParaRPr lang="en-US" dirty="0"/>
+          </a:p>
+        </p:txBody>
+      </p:sp>
+    </p:spTree>
+    <p:extLst>
+      <p:ext uri="{BB962C8B-B14F-4D97-AF65-F5344CB8AC3E}">
+        <p14:creationId xmlns:p14="http://schemas.microsoft.com/office/powerpoint/2010/main" val="1170121486"/>
       </p:ext>
     </p:extLst>
   </p:cSld>

</xml_diff>